<commit_message>
more changes in the site
</commit_message>
<xml_diff>
--- a/speaker-poster/ppt/Rahul Ambhore.pptx
+++ b/speaker-poster/ppt/Rahul Ambhore.pptx
@@ -261,7 +261,7 @@
           <a:p>
             <a:fld id="{4734258E-F4BA-40A9-ADC0-291CE1545D60}" type="datetimeFigureOut">
               <a:rPr lang="en-IN" smtClean="0"/>
-              <a:t>22-08-2021</a:t>
+              <a:t>23-08-2021</a:t>
             </a:fld>
             <a:endParaRPr lang="en-IN"/>
           </a:p>
@@ -461,7 +461,7 @@
           <a:p>
             <a:fld id="{4734258E-F4BA-40A9-ADC0-291CE1545D60}" type="datetimeFigureOut">
               <a:rPr lang="en-IN" smtClean="0"/>
-              <a:t>22-08-2021</a:t>
+              <a:t>23-08-2021</a:t>
             </a:fld>
             <a:endParaRPr lang="en-IN"/>
           </a:p>
@@ -671,7 +671,7 @@
           <a:p>
             <a:fld id="{4734258E-F4BA-40A9-ADC0-291CE1545D60}" type="datetimeFigureOut">
               <a:rPr lang="en-IN" smtClean="0"/>
-              <a:t>22-08-2021</a:t>
+              <a:t>23-08-2021</a:t>
             </a:fld>
             <a:endParaRPr lang="en-IN"/>
           </a:p>
@@ -871,7 +871,7 @@
           <a:p>
             <a:fld id="{4734258E-F4BA-40A9-ADC0-291CE1545D60}" type="datetimeFigureOut">
               <a:rPr lang="en-IN" smtClean="0"/>
-              <a:t>22-08-2021</a:t>
+              <a:t>23-08-2021</a:t>
             </a:fld>
             <a:endParaRPr lang="en-IN"/>
           </a:p>
@@ -1147,7 +1147,7 @@
           <a:p>
             <a:fld id="{4734258E-F4BA-40A9-ADC0-291CE1545D60}" type="datetimeFigureOut">
               <a:rPr lang="en-IN" smtClean="0"/>
-              <a:t>22-08-2021</a:t>
+              <a:t>23-08-2021</a:t>
             </a:fld>
             <a:endParaRPr lang="en-IN"/>
           </a:p>
@@ -1415,7 +1415,7 @@
           <a:p>
             <a:fld id="{4734258E-F4BA-40A9-ADC0-291CE1545D60}" type="datetimeFigureOut">
               <a:rPr lang="en-IN" smtClean="0"/>
-              <a:t>22-08-2021</a:t>
+              <a:t>23-08-2021</a:t>
             </a:fld>
             <a:endParaRPr lang="en-IN"/>
           </a:p>
@@ -1830,7 +1830,7 @@
           <a:p>
             <a:fld id="{4734258E-F4BA-40A9-ADC0-291CE1545D60}" type="datetimeFigureOut">
               <a:rPr lang="en-IN" smtClean="0"/>
-              <a:t>22-08-2021</a:t>
+              <a:t>23-08-2021</a:t>
             </a:fld>
             <a:endParaRPr lang="en-IN"/>
           </a:p>
@@ -1972,7 +1972,7 @@
           <a:p>
             <a:fld id="{4734258E-F4BA-40A9-ADC0-291CE1545D60}" type="datetimeFigureOut">
               <a:rPr lang="en-IN" smtClean="0"/>
-              <a:t>22-08-2021</a:t>
+              <a:t>23-08-2021</a:t>
             </a:fld>
             <a:endParaRPr lang="en-IN"/>
           </a:p>
@@ -2085,7 +2085,7 @@
           <a:p>
             <a:fld id="{4734258E-F4BA-40A9-ADC0-291CE1545D60}" type="datetimeFigureOut">
               <a:rPr lang="en-IN" smtClean="0"/>
-              <a:t>22-08-2021</a:t>
+              <a:t>23-08-2021</a:t>
             </a:fld>
             <a:endParaRPr lang="en-IN"/>
           </a:p>
@@ -2398,7 +2398,7 @@
           <a:p>
             <a:fld id="{4734258E-F4BA-40A9-ADC0-291CE1545D60}" type="datetimeFigureOut">
               <a:rPr lang="en-IN" smtClean="0"/>
-              <a:t>22-08-2021</a:t>
+              <a:t>23-08-2021</a:t>
             </a:fld>
             <a:endParaRPr lang="en-IN"/>
           </a:p>
@@ -2687,7 +2687,7 @@
           <a:p>
             <a:fld id="{4734258E-F4BA-40A9-ADC0-291CE1545D60}" type="datetimeFigureOut">
               <a:rPr lang="en-IN" smtClean="0"/>
-              <a:t>22-08-2021</a:t>
+              <a:t>23-08-2021</a:t>
             </a:fld>
             <a:endParaRPr lang="en-IN"/>
           </a:p>
@@ -2930,7 +2930,7 @@
           <a:p>
             <a:fld id="{4734258E-F4BA-40A9-ADC0-291CE1545D60}" type="datetimeFigureOut">
               <a:rPr lang="en-IN" smtClean="0"/>
-              <a:t>22-08-2021</a:t>
+              <a:t>23-08-2021</a:t>
             </a:fld>
             <a:endParaRPr lang="en-IN"/>
           </a:p>
@@ -3588,10 +3588,10 @@
       </p:pic>
       <p:pic>
         <p:nvPicPr>
-          <p:cNvPr id="8" name="Picture 7" descr="Icon&#10;&#10;Description automatically generated">
-            <a:extLst>
-              <a:ext uri="{FF2B5EF4-FFF2-40B4-BE49-F238E27FC236}">
-                <a16:creationId xmlns:a16="http://schemas.microsoft.com/office/drawing/2014/main" id="{60BC8994-B564-4488-864E-FF3D1C9D7018}"/>
+          <p:cNvPr id="12" name="Picture 11">
+            <a:extLst>
+              <a:ext uri="{FF2B5EF4-FFF2-40B4-BE49-F238E27FC236}">
+                <a16:creationId xmlns:a16="http://schemas.microsoft.com/office/drawing/2014/main" id="{020F98FC-8B25-42E3-A227-E0E1089A48FA}"/>
               </a:ext>
             </a:extLst>
           </p:cNvPr>
@@ -3601,104 +3601,7 @@
           <p:nvPr/>
         </p:nvPicPr>
         <p:blipFill>
-          <a:blip r:embed="rId7">
-            <a:extLst>
-              <a:ext uri="{28A0092B-C50C-407E-A947-70E740481C1C}">
-                <a14:useLocalDpi xmlns:a14="http://schemas.microsoft.com/office/drawing/2010/main" val="0"/>
-              </a:ext>
-            </a:extLst>
-          </a:blip>
-          <a:stretch>
-            <a:fillRect/>
-          </a:stretch>
-        </p:blipFill>
-        <p:spPr>
-          <a:xfrm>
-            <a:off x="406214" y="3724279"/>
-            <a:ext cx="200489" cy="200489"/>
-          </a:xfrm>
-          <a:prstGeom prst="rect">
-            <a:avLst/>
-          </a:prstGeom>
-        </p:spPr>
-      </p:pic>
-      <p:sp>
-        <p:nvSpPr>
-          <p:cNvPr id="11" name="TextBox 10">
-            <a:extLst>
-              <a:ext uri="{FF2B5EF4-FFF2-40B4-BE49-F238E27FC236}">
-                <a16:creationId xmlns:a16="http://schemas.microsoft.com/office/drawing/2014/main" id="{C2CAF015-F0BF-4065-8E65-7234B1739948}"/>
-              </a:ext>
-            </a:extLst>
-          </p:cNvPr>
-          <p:cNvSpPr txBox="1"/>
-          <p:nvPr/>
-        </p:nvSpPr>
-        <p:spPr>
-          <a:xfrm>
-            <a:off x="601854" y="3693718"/>
-            <a:ext cx="2132164" cy="253916"/>
-          </a:xfrm>
-          <a:prstGeom prst="rect">
-            <a:avLst/>
-          </a:prstGeom>
-          <a:noFill/>
-        </p:spPr>
-        <p:txBody>
-          <a:bodyPr wrap="square" rtlCol="0">
-            <a:spAutoFit/>
-          </a:bodyPr>
-          <a:lstStyle/>
-          <a:p>
-            <a:r>
-              <a:rPr lang="en-US" sz="1050" dirty="0">
-                <a:solidFill>
-                  <a:schemeClr val="tx1">
-                    <a:lumMod val="50000"/>
-                    <a:lumOff val="50000"/>
-                  </a:schemeClr>
-                </a:solidFill>
-              </a:rPr>
-              <a:t>Rahul </a:t>
-            </a:r>
-            <a:r>
-              <a:rPr lang="en-US" sz="1050" dirty="0" err="1">
-                <a:solidFill>
-                  <a:schemeClr val="tx1">
-                    <a:lumMod val="50000"/>
-                    <a:lumOff val="50000"/>
-                  </a:schemeClr>
-                </a:solidFill>
-              </a:rPr>
-              <a:t>Ambhore</a:t>
-            </a:r>
-            <a:endParaRPr lang="en-IN" sz="1050" dirty="0">
-              <a:solidFill>
-                <a:schemeClr val="tx1">
-                  <a:lumMod val="50000"/>
-                  <a:lumOff val="50000"/>
-                </a:schemeClr>
-              </a:solidFill>
-            </a:endParaRPr>
-          </a:p>
-        </p:txBody>
-      </p:sp>
-      <p:pic>
-        <p:nvPicPr>
-          <p:cNvPr id="12" name="Picture 11">
-            <a:extLst>
-              <a:ext uri="{FF2B5EF4-FFF2-40B4-BE49-F238E27FC236}">
-                <a16:creationId xmlns:a16="http://schemas.microsoft.com/office/drawing/2014/main" id="{020F98FC-8B25-42E3-A227-E0E1089A48FA}"/>
-              </a:ext>
-            </a:extLst>
-          </p:cNvPr>
-          <p:cNvPicPr>
-            <a:picLocks noChangeAspect="1"/>
-          </p:cNvPicPr>
-          <p:nvPr/>
-        </p:nvPicPr>
-        <p:blipFill>
-          <a:blip r:embed="rId8"/>
+          <a:blip r:embed="rId7"/>
           <a:stretch>
             <a:fillRect/>
           </a:stretch>
@@ -3775,7 +3678,7 @@
           <p:nvPr/>
         </p:nvPicPr>
         <p:blipFill rotWithShape="1">
-          <a:blip r:embed="rId9">
+          <a:blip r:embed="rId8">
             <a:alphaModFix amt="71000"/>
             <a:extLst>
               <a:ext uri="{28A0092B-C50C-407E-A947-70E740481C1C}">
@@ -4088,6 +3991,92 @@
               <a:buChar char="Ø"/>
             </a:pPr>
             <a:endParaRPr lang="en-IN" sz="3200" dirty="0"/>
+          </a:p>
+        </p:txBody>
+      </p:sp>
+      <p:pic>
+        <p:nvPicPr>
+          <p:cNvPr id="19" name="Picture 18" descr="Logo&#10;&#10;Description automatically generated">
+            <a:extLst>
+              <a:ext uri="{FF2B5EF4-FFF2-40B4-BE49-F238E27FC236}">
+                <a16:creationId xmlns:a16="http://schemas.microsoft.com/office/drawing/2014/main" id="{9C1647EA-1491-4A1F-BB06-01FD7F6A3A0E}"/>
+              </a:ext>
+            </a:extLst>
+          </p:cNvPr>
+          <p:cNvPicPr>
+            <a:picLocks noChangeAspect="1"/>
+          </p:cNvPicPr>
+          <p:nvPr/>
+        </p:nvPicPr>
+        <p:blipFill>
+          <a:blip r:embed="rId9">
+            <a:extLst>
+              <a:ext uri="{28A0092B-C50C-407E-A947-70E740481C1C}">
+                <a14:useLocalDpi xmlns:a14="http://schemas.microsoft.com/office/drawing/2010/main" val="0"/>
+              </a:ext>
+            </a:extLst>
+          </a:blip>
+          <a:stretch>
+            <a:fillRect/>
+          </a:stretch>
+        </p:blipFill>
+        <p:spPr>
+          <a:xfrm>
+            <a:off x="601854" y="3631275"/>
+            <a:ext cx="259670" cy="259670"/>
+          </a:xfrm>
+          <a:prstGeom prst="rect">
+            <a:avLst/>
+          </a:prstGeom>
+        </p:spPr>
+      </p:pic>
+      <p:sp>
+        <p:nvSpPr>
+          <p:cNvPr id="21" name="TextBox 20">
+            <a:extLst>
+              <a:ext uri="{FF2B5EF4-FFF2-40B4-BE49-F238E27FC236}">
+                <a16:creationId xmlns:a16="http://schemas.microsoft.com/office/drawing/2014/main" id="{5480FFB9-F516-44B7-96C6-72FB361754B6}"/>
+              </a:ext>
+            </a:extLst>
+          </p:cNvPr>
+          <p:cNvSpPr txBox="1"/>
+          <p:nvPr/>
+        </p:nvSpPr>
+        <p:spPr>
+          <a:xfrm>
+            <a:off x="824876" y="3630305"/>
+            <a:ext cx="2132164" cy="261610"/>
+          </a:xfrm>
+          <a:prstGeom prst="rect">
+            <a:avLst/>
+          </a:prstGeom>
+          <a:noFill/>
+        </p:spPr>
+        <p:txBody>
+          <a:bodyPr wrap="square" rtlCol="0">
+            <a:spAutoFit/>
+          </a:bodyPr>
+          <a:lstStyle/>
+          <a:p>
+            <a:r>
+              <a:rPr lang="en-US" sz="1050" dirty="0">
+                <a:solidFill>
+                  <a:schemeClr val="tx1">
+                    <a:lumMod val="50000"/>
+                    <a:lumOff val="50000"/>
+                  </a:schemeClr>
+                </a:solidFill>
+              </a:rPr>
+              <a:t>RahulAmbhore3</a:t>
+            </a:r>
+            <a:endParaRPr lang="en-IN" sz="1050" dirty="0">
+              <a:solidFill>
+                <a:schemeClr val="tx1">
+                  <a:lumMod val="50000"/>
+                  <a:lumOff val="50000"/>
+                </a:schemeClr>
+              </a:solidFill>
+            </a:endParaRPr>
           </a:p>
         </p:txBody>
       </p:sp>

</xml_diff>